<commit_message>
remove aupdate nyr conf blog
</commit_message>
<xml_diff>
--- a/content/blog/nyrconf/plot.pptx
+++ b/content/blog/nyrconf/plot.pptx
@@ -2271,7 +2271,7 @@
           </p:nvSpPr>
           <p:spPr>
             <a:xfrm>
-              <a:off x="2899727" y="3796395"/>
+              <a:off x="3124394" y="3184069"/>
               <a:ext cx="68579" cy="68579"/>
             </a:xfrm>
             <a:prstGeom prst="ellipse">
@@ -2297,7 +2297,7 @@
           </p:nvSpPr>
           <p:spPr>
             <a:xfrm>
-              <a:off x="3061882" y="2913145"/>
+              <a:off x="2181028" y="3313642"/>
               <a:ext cx="68579" cy="68579"/>
             </a:xfrm>
             <a:prstGeom prst="ellipse">
@@ -2323,7 +2323,7 @@
           </p:nvSpPr>
           <p:spPr>
             <a:xfrm>
-              <a:off x="2870989" y="2938305"/>
+              <a:off x="2088620" y="3263705"/>
               <a:ext cx="68579" cy="68579"/>
             </a:xfrm>
             <a:prstGeom prst="ellipse">
@@ -2349,7 +2349,7 @@
           </p:nvSpPr>
           <p:spPr>
             <a:xfrm>
-              <a:off x="4513584" y="3229635"/>
+              <a:off x="1593988" y="2759496"/>
               <a:ext cx="68579" cy="68579"/>
             </a:xfrm>
             <a:prstGeom prst="ellipse">
@@ -2375,7 +2375,7 @@
           </p:nvSpPr>
           <p:spPr>
             <a:xfrm>
-              <a:off x="3392527" y="3359550"/>
+              <a:off x="3169542" y="3723916"/>
               <a:ext cx="68579" cy="68579"/>
             </a:xfrm>
             <a:prstGeom prst="ellipse">
@@ -2401,7 +2401,7 @@
           </p:nvSpPr>
           <p:spPr>
             <a:xfrm>
-              <a:off x="2642229" y="2879063"/>
+              <a:off x="2638790" y="3532034"/>
               <a:ext cx="68579" cy="68579"/>
             </a:xfrm>
             <a:prstGeom prst="ellipse">
@@ -2427,7 +2427,7 @@
           </p:nvSpPr>
           <p:spPr>
             <a:xfrm>
-              <a:off x="2325705" y="3010068"/>
+              <a:off x="3548341" y="3146996"/>
               <a:ext cx="68579" cy="68579"/>
             </a:xfrm>
             <a:prstGeom prst="ellipse">
@@ -2453,7 +2453,7 @@
           </p:nvSpPr>
           <p:spPr>
             <a:xfrm>
-              <a:off x="3624569" y="3078441"/>
+              <a:off x="3081825" y="3355405"/>
               <a:ext cx="68579" cy="68579"/>
             </a:xfrm>
             <a:prstGeom prst="ellipse">
@@ -2479,7 +2479,7 @@
           </p:nvSpPr>
           <p:spPr>
             <a:xfrm>
-              <a:off x="2790710" y="2930444"/>
+              <a:off x="3088632" y="3090853"/>
               <a:ext cx="68579" cy="68579"/>
             </a:xfrm>
             <a:prstGeom prst="ellipse">
@@ -2505,7 +2505,7 @@
           </p:nvSpPr>
           <p:spPr>
             <a:xfrm>
-              <a:off x="3128714" y="3202964"/>
+              <a:off x="2743032" y="3916081"/>
               <a:ext cx="68579" cy="68579"/>
             </a:xfrm>
             <a:prstGeom prst="ellipse">
@@ -2531,7 +2531,7 @@
           </p:nvSpPr>
           <p:spPr>
             <a:xfrm>
-              <a:off x="3939485" y="3574477"/>
+              <a:off x="2366026" y="3620192"/>
               <a:ext cx="68579" cy="68579"/>
             </a:xfrm>
             <a:prstGeom prst="ellipse">
@@ -2557,7 +2557,7 @@
           </p:nvSpPr>
           <p:spPr>
             <a:xfrm>
-              <a:off x="3787205" y="3807821"/>
+              <a:off x="2679891" y="2984990"/>
               <a:ext cx="68579" cy="68579"/>
             </a:xfrm>
             <a:prstGeom prst="ellipse">
@@ -2583,7 +2583,7 @@
           </p:nvSpPr>
           <p:spPr>
             <a:xfrm>
-              <a:off x="2022575" y="3261137"/>
+              <a:off x="3116998" y="2892871"/>
               <a:ext cx="68579" cy="68579"/>
             </a:xfrm>
             <a:prstGeom prst="ellipse">
@@ -2609,7 +2609,7 @@
           </p:nvSpPr>
           <p:spPr>
             <a:xfrm>
-              <a:off x="3660797" y="3064758"/>
+              <a:off x="4195522" y="2672702"/>
               <a:ext cx="68579" cy="68579"/>
             </a:xfrm>
             <a:prstGeom prst="ellipse">
@@ -2635,7 +2635,7 @@
           </p:nvSpPr>
           <p:spPr>
             <a:xfrm>
-              <a:off x="3823606" y="3518364"/>
+              <a:off x="2746193" y="3676427"/>
               <a:ext cx="68579" cy="68579"/>
             </a:xfrm>
             <a:prstGeom prst="ellipse">
@@ -2661,7 +2661,7 @@
           </p:nvSpPr>
           <p:spPr>
             <a:xfrm>
-              <a:off x="2218847" y="3819083"/>
+              <a:off x="3029269" y="2866034"/>
               <a:ext cx="68579" cy="68579"/>
             </a:xfrm>
             <a:prstGeom prst="ellipse">
@@ -2687,7 +2687,7 @@
           </p:nvSpPr>
           <p:spPr>
             <a:xfrm>
-              <a:off x="4007933" y="2739572"/>
+              <a:off x="2106037" y="3458731"/>
               <a:ext cx="68579" cy="68579"/>
             </a:xfrm>
             <a:prstGeom prst="ellipse">
@@ -2713,7 +2713,7 @@
           </p:nvSpPr>
           <p:spPr>
             <a:xfrm>
-              <a:off x="3055387" y="3361343"/>
+              <a:off x="4310675" y="3523492"/>
               <a:ext cx="68579" cy="68579"/>
             </a:xfrm>
             <a:prstGeom prst="ellipse">
@@ -2739,7 +2739,7 @@
           </p:nvSpPr>
           <p:spPr>
             <a:xfrm>
-              <a:off x="4144763" y="3392325"/>
+              <a:off x="2846534" y="3249533"/>
               <a:ext cx="68579" cy="68579"/>
             </a:xfrm>
             <a:prstGeom prst="ellipse">
@@ -2765,7 +2765,7 @@
           </p:nvSpPr>
           <p:spPr>
             <a:xfrm>
-              <a:off x="3909410" y="2933659"/>
+              <a:off x="3067198" y="2802389"/>
               <a:ext cx="68579" cy="68579"/>
             </a:xfrm>
             <a:prstGeom prst="ellipse">
@@ -2791,7 +2791,7 @@
           </p:nvSpPr>
           <p:spPr>
             <a:xfrm>
-              <a:off x="3928210" y="3001872"/>
+              <a:off x="2564350" y="3509455"/>
               <a:ext cx="68579" cy="68579"/>
             </a:xfrm>
             <a:prstGeom prst="ellipse">
@@ -2817,7 +2817,7 @@
           </p:nvSpPr>
           <p:spPr>
             <a:xfrm>
-              <a:off x="3794864" y="3167261"/>
+              <a:off x="3665476" y="3441662"/>
               <a:ext cx="68579" cy="68579"/>
             </a:xfrm>
             <a:prstGeom prst="ellipse">
@@ -2843,7 +2843,7 @@
           </p:nvSpPr>
           <p:spPr>
             <a:xfrm>
-              <a:off x="4537488" y="2689495"/>
+              <a:off x="3672010" y="3255891"/>
               <a:ext cx="68579" cy="68579"/>
             </a:xfrm>
             <a:prstGeom prst="ellipse">
@@ -2869,7 +2869,7 @@
           </p:nvSpPr>
           <p:spPr>
             <a:xfrm>
-              <a:off x="4889072" y="2864545"/>
+              <a:off x="3097545" y="3280145"/>
               <a:ext cx="68579" cy="68579"/>
             </a:xfrm>
             <a:prstGeom prst="ellipse">
@@ -2895,7 +2895,7 @@
           </p:nvSpPr>
           <p:spPr>
             <a:xfrm>
-              <a:off x="2418050" y="3860571"/>
+              <a:off x="3654002" y="3068853"/>
               <a:ext cx="68579" cy="68579"/>
             </a:xfrm>
             <a:prstGeom prst="ellipse">
@@ -2921,7 +2921,7 @@
           </p:nvSpPr>
           <p:spPr>
             <a:xfrm>
-              <a:off x="2982140" y="2931657"/>
+              <a:off x="4482177" y="2812061"/>
               <a:ext cx="68579" cy="68579"/>
             </a:xfrm>
             <a:prstGeom prst="ellipse">
@@ -2947,7 +2947,7 @@
           </p:nvSpPr>
           <p:spPr>
             <a:xfrm>
-              <a:off x="4692907" y="2965684"/>
+              <a:off x="3656084" y="3612796"/>
               <a:ext cx="68579" cy="68579"/>
             </a:xfrm>
             <a:prstGeom prst="ellipse">
@@ -2973,7 +2973,7 @@
           </p:nvSpPr>
           <p:spPr>
             <a:xfrm>
-              <a:off x="2255358" y="3058360"/>
+              <a:off x="3349705" y="3460422"/>
               <a:ext cx="68579" cy="68579"/>
             </a:xfrm>
             <a:prstGeom prst="ellipse">
@@ -2999,7 +2999,7 @@
           </p:nvSpPr>
           <p:spPr>
             <a:xfrm>
-              <a:off x="4076163" y="2844915"/>
+              <a:off x="2436093" y="3310846"/>
               <a:ext cx="68579" cy="68579"/>
             </a:xfrm>
             <a:prstGeom prst="ellipse">
@@ -3025,7 +3025,7 @@
           </p:nvSpPr>
           <p:spPr>
             <a:xfrm>
-              <a:off x="4554141" y="2388869"/>
+              <a:off x="2455167" y="3666813"/>
               <a:ext cx="68579" cy="68579"/>
             </a:xfrm>
             <a:prstGeom prst="ellipse">
@@ -3051,7 +3051,7 @@
           </p:nvSpPr>
           <p:spPr>
             <a:xfrm>
-              <a:off x="4533604" y="3483180"/>
+              <a:off x="3691299" y="3164390"/>
               <a:ext cx="68579" cy="68579"/>
             </a:xfrm>
             <a:prstGeom prst="ellipse">
@@ -3077,7 +3077,7 @@
           </p:nvSpPr>
           <p:spPr>
             <a:xfrm>
-              <a:off x="3231921" y="2778972"/>
+              <a:off x="4238151" y="4217669"/>
               <a:ext cx="68579" cy="68579"/>
             </a:xfrm>
             <a:prstGeom prst="ellipse">
@@ -3103,7 +3103,7 @@
           </p:nvSpPr>
           <p:spPr>
             <a:xfrm>
-              <a:off x="3682013" y="3102962"/>
+              <a:off x="3438310" y="3311730"/>
               <a:ext cx="68579" cy="68579"/>
             </a:xfrm>
             <a:prstGeom prst="ellipse">
@@ -3129,7 +3129,7 @@
           </p:nvSpPr>
           <p:spPr>
             <a:xfrm>
-              <a:off x="2459964" y="3995477"/>
+              <a:off x="2555150" y="3003134"/>
               <a:ext cx="68579" cy="68579"/>
             </a:xfrm>
             <a:prstGeom prst="ellipse">
@@ -3155,7 +3155,7 @@
           </p:nvSpPr>
           <p:spPr>
             <a:xfrm>
-              <a:off x="4925446" y="2566956"/>
+              <a:off x="3892034" y="3958025"/>
               <a:ext cx="68579" cy="68579"/>
             </a:xfrm>
             <a:prstGeom prst="ellipse">
@@ -3181,7 +3181,7 @@
           </p:nvSpPr>
           <p:spPr>
             <a:xfrm>
-              <a:off x="3770649" y="3036204"/>
+              <a:off x="3051782" y="3671607"/>
               <a:ext cx="68579" cy="68579"/>
             </a:xfrm>
             <a:prstGeom prst="ellipse">
@@ -3207,7 +3207,7 @@
           </p:nvSpPr>
           <p:spPr>
             <a:xfrm>
-              <a:off x="3899189" y="3463326"/>
+              <a:off x="3138025" y="2821575"/>
               <a:ext cx="68579" cy="68579"/>
             </a:xfrm>
             <a:prstGeom prst="ellipse">
@@ -3233,7 +3233,7 @@
           </p:nvSpPr>
           <p:spPr>
             <a:xfrm>
-              <a:off x="2879944" y="3110624"/>
+              <a:off x="2704149" y="3235782"/>
               <a:ext cx="68579" cy="68579"/>
             </a:xfrm>
             <a:prstGeom prst="ellipse">
@@ -3259,7 +3259,7 @@
           </p:nvSpPr>
           <p:spPr>
             <a:xfrm>
-              <a:off x="4742412" y="3195852"/>
+              <a:off x="3022248" y="3496326"/>
               <a:ext cx="68579" cy="68579"/>
             </a:xfrm>
             <a:prstGeom prst="ellipse">
@@ -3285,7 +3285,7 @@
           </p:nvSpPr>
           <p:spPr>
             <a:xfrm>
-              <a:off x="4781211" y="3476649"/>
+              <a:off x="3787238" y="2486691"/>
               <a:ext cx="68579" cy="68579"/>
             </a:xfrm>
             <a:prstGeom prst="ellipse">
@@ -3311,7 +3311,7 @@
           </p:nvSpPr>
           <p:spPr>
             <a:xfrm>
-              <a:off x="3683952" y="3090852"/>
+              <a:off x="2199194" y="3970784"/>
               <a:ext cx="68579" cy="68579"/>
             </a:xfrm>
             <a:prstGeom prst="ellipse">
@@ -3337,7 +3337,7 @@
           </p:nvSpPr>
           <p:spPr>
             <a:xfrm>
-              <a:off x="5364056" y="3870014"/>
+              <a:off x="2817186" y="4189080"/>
               <a:ext cx="68579" cy="68579"/>
             </a:xfrm>
             <a:prstGeom prst="ellipse">
@@ -3363,7 +3363,7 @@
           </p:nvSpPr>
           <p:spPr>
             <a:xfrm>
-              <a:off x="3844305" y="3343143"/>
+              <a:off x="3594168" y="3386403"/>
               <a:ext cx="68579" cy="68579"/>
             </a:xfrm>
             <a:prstGeom prst="ellipse">
@@ -3389,7 +3389,7 @@
           </p:nvSpPr>
           <p:spPr>
             <a:xfrm>
-              <a:off x="4244236" y="3480529"/>
+              <a:off x="2461858" y="3288843"/>
               <a:ext cx="68579" cy="68579"/>
             </a:xfrm>
             <a:prstGeom prst="ellipse">
@@ -3415,7 +3415,7 @@
           </p:nvSpPr>
           <p:spPr>
             <a:xfrm>
-              <a:off x="3375785" y="3117138"/>
+              <a:off x="3587449" y="3666406"/>
               <a:ext cx="68579" cy="68579"/>
             </a:xfrm>
             <a:prstGeom prst="ellipse">
@@ -3441,7 +3441,7 @@
           </p:nvSpPr>
           <p:spPr>
             <a:xfrm>
-              <a:off x="3858452" y="3008583"/>
+              <a:off x="4600817" y="3761559"/>
               <a:ext cx="68579" cy="68579"/>
             </a:xfrm>
             <a:prstGeom prst="ellipse">
@@ -3467,7 +3467,7 @@
           </p:nvSpPr>
           <p:spPr>
             <a:xfrm>
-              <a:off x="3069393" y="3481214"/>
+              <a:off x="3558646" y="3249076"/>
               <a:ext cx="68579" cy="68579"/>
             </a:xfrm>
             <a:prstGeom prst="ellipse">
@@ -3493,7 +3493,7 @@
           </p:nvSpPr>
           <p:spPr>
             <a:xfrm>
-              <a:off x="2802743" y="3168226"/>
+              <a:off x="3679839" y="2925266"/>
               <a:ext cx="68579" cy="68579"/>
             </a:xfrm>
             <a:prstGeom prst="ellipse">
@@ -3519,7 +3519,7 @@
           </p:nvSpPr>
           <p:spPr>
             <a:xfrm>
-              <a:off x="3303445" y="4206096"/>
+              <a:off x="2324439" y="3638449"/>
               <a:ext cx="68579" cy="68579"/>
             </a:xfrm>
             <a:prstGeom prst="ellipse">
@@ -3545,7 +3545,7 @@
           </p:nvSpPr>
           <p:spPr>
             <a:xfrm>
-              <a:off x="3612164" y="2815881"/>
+              <a:off x="3087813" y="3613769"/>
               <a:ext cx="68579" cy="68579"/>
             </a:xfrm>
             <a:prstGeom prst="ellipse">
@@ -3571,7 +3571,7 @@
           </p:nvSpPr>
           <p:spPr>
             <a:xfrm>
-              <a:off x="3365821" y="3969684"/>
+              <a:off x="3895179" y="3171423"/>
               <a:ext cx="68579" cy="68579"/>
             </a:xfrm>
             <a:prstGeom prst="ellipse">
@@ -3597,7 +3597,7 @@
           </p:nvSpPr>
           <p:spPr>
             <a:xfrm>
-              <a:off x="3859526" y="2488890"/>
+              <a:off x="2783236" y="2874391"/>
               <a:ext cx="68579" cy="68579"/>
             </a:xfrm>
             <a:prstGeom prst="ellipse">
@@ -3623,7 +3623,7 @@
           </p:nvSpPr>
           <p:spPr>
             <a:xfrm>
-              <a:off x="4741115" y="3087943"/>
+              <a:off x="2098830" y="3011144"/>
               <a:ext cx="68579" cy="68579"/>
             </a:xfrm>
             <a:prstGeom prst="ellipse">
@@ -3649,7 +3649,7 @@
           </p:nvSpPr>
           <p:spPr>
             <a:xfrm>
-              <a:off x="4666770" y="3195282"/>
+              <a:off x="3415878" y="3301817"/>
               <a:ext cx="68579" cy="68579"/>
             </a:xfrm>
             <a:prstGeom prst="ellipse">
@@ -3675,7 +3675,7 @@
           </p:nvSpPr>
           <p:spPr>
             <a:xfrm>
-              <a:off x="3158293" y="3396467"/>
+              <a:off x="3121980" y="3491517"/>
               <a:ext cx="68579" cy="68579"/>
             </a:xfrm>
             <a:prstGeom prst="ellipse">
@@ -3701,7 +3701,7 @@
           </p:nvSpPr>
           <p:spPr>
             <a:xfrm>
-              <a:off x="3437932" y="3437270"/>
+              <a:off x="3353751" y="2822895"/>
               <a:ext cx="68579" cy="68579"/>
             </a:xfrm>
             <a:prstGeom prst="ellipse">
@@ -3727,7 +3727,7 @@
           </p:nvSpPr>
           <p:spPr>
             <a:xfrm>
-              <a:off x="5163363" y="3732066"/>
+              <a:off x="3152715" y="3411683"/>
               <a:ext cx="68579" cy="68579"/>
             </a:xfrm>
             <a:prstGeom prst="ellipse">
@@ -3753,7 +3753,7 @@
           </p:nvSpPr>
           <p:spPr>
             <a:xfrm>
-              <a:off x="3867692" y="2564706"/>
+              <a:off x="2158354" y="3863355"/>
               <a:ext cx="68579" cy="68579"/>
             </a:xfrm>
             <a:prstGeom prst="ellipse">
@@ -3779,7 +3779,7 @@
           </p:nvSpPr>
           <p:spPr>
             <a:xfrm>
-              <a:off x="3805772" y="3619941"/>
+              <a:off x="3580454" y="4061332"/>
               <a:ext cx="68579" cy="68579"/>
             </a:xfrm>
             <a:prstGeom prst="ellipse">
@@ -3805,7 +3805,7 @@
           </p:nvSpPr>
           <p:spPr>
             <a:xfrm>
-              <a:off x="3934085" y="2861533"/>
+              <a:off x="2807631" y="3449674"/>
               <a:ext cx="68579" cy="68579"/>
             </a:xfrm>
             <a:prstGeom prst="ellipse">
@@ -3831,7 +3831,7 @@
           </p:nvSpPr>
           <p:spPr>
             <a:xfrm>
-              <a:off x="1703587" y="3159570"/>
+              <a:off x="3074227" y="3945095"/>
               <a:ext cx="68579" cy="68579"/>
             </a:xfrm>
             <a:prstGeom prst="ellipse">
@@ -3857,7 +3857,7 @@
           </p:nvSpPr>
           <p:spPr>
             <a:xfrm>
-              <a:off x="4057210" y="3850819"/>
+              <a:off x="3398177" y="3204744"/>
               <a:ext cx="68579" cy="68579"/>
             </a:xfrm>
             <a:prstGeom prst="ellipse">
@@ -3883,7 +3883,7 @@
           </p:nvSpPr>
           <p:spPr>
             <a:xfrm>
-              <a:off x="3437209" y="2987656"/>
+              <a:off x="2634523" y="3211906"/>
               <a:ext cx="68579" cy="68579"/>
             </a:xfrm>
             <a:prstGeom prst="ellipse">
@@ -3909,7 +3909,7 @@
           </p:nvSpPr>
           <p:spPr>
             <a:xfrm>
-              <a:off x="3790363" y="3525663"/>
+              <a:off x="5364056" y="2934587"/>
               <a:ext cx="68579" cy="68579"/>
             </a:xfrm>
             <a:prstGeom prst="ellipse">
@@ -3935,7 +3935,7 @@
           </p:nvSpPr>
           <p:spPr>
             <a:xfrm>
-              <a:off x="3539866" y="2749971"/>
+              <a:off x="3468837" y="3415899"/>
               <a:ext cx="68579" cy="68579"/>
             </a:xfrm>
             <a:prstGeom prst="ellipse">
@@ -3961,7 +3961,7 @@
           </p:nvSpPr>
           <p:spPr>
             <a:xfrm>
-              <a:off x="3696395" y="3422859"/>
+              <a:off x="2866158" y="3644238"/>
               <a:ext cx="68579" cy="68579"/>
             </a:xfrm>
             <a:prstGeom prst="ellipse">
@@ -3987,7 +3987,7 @@
           </p:nvSpPr>
           <p:spPr>
             <a:xfrm>
-              <a:off x="2366412" y="3464217"/>
+              <a:off x="3059893" y="3763643"/>
               <a:ext cx="68579" cy="68579"/>
             </a:xfrm>
             <a:prstGeom prst="ellipse">
@@ -4013,7 +4013,7 @@
           </p:nvSpPr>
           <p:spPr>
             <a:xfrm>
-              <a:off x="4116623" y="3617903"/>
+              <a:off x="2832281" y="3077350"/>
               <a:ext cx="68579" cy="68579"/>
             </a:xfrm>
             <a:prstGeom prst="ellipse">
@@ -4039,7 +4039,7 @@
           </p:nvSpPr>
           <p:spPr>
             <a:xfrm>
-              <a:off x="3225233" y="3338092"/>
+              <a:off x="2774553" y="3035206"/>
               <a:ext cx="68579" cy="68579"/>
             </a:xfrm>
             <a:prstGeom prst="ellipse">
@@ -4065,7 +4065,7 @@
           </p:nvSpPr>
           <p:spPr>
             <a:xfrm>
-              <a:off x="3680287" y="3383152"/>
+              <a:off x="1765004" y="2944418"/>
               <a:ext cx="68579" cy="68579"/>
             </a:xfrm>
             <a:prstGeom prst="ellipse">
@@ -4091,7 +4091,7 @@
           </p:nvSpPr>
           <p:spPr>
             <a:xfrm>
-              <a:off x="4644152" y="4217669"/>
+              <a:off x="3129846" y="3768644"/>
               <a:ext cx="68579" cy="68579"/>
             </a:xfrm>
             <a:prstGeom prst="ellipse">
@@ -4117,7 +4117,7 @@
           </p:nvSpPr>
           <p:spPr>
             <a:xfrm>
-              <a:off x="2960086" y="3874184"/>
+              <a:off x="3945111" y="3735984"/>
               <a:ext cx="68579" cy="68579"/>
             </a:xfrm>
             <a:prstGeom prst="ellipse">
@@ -4143,7 +4143,7 @@
           </p:nvSpPr>
           <p:spPr>
             <a:xfrm>
-              <a:off x="4549071" y="2581125"/>
+              <a:off x="3437739" y="2607080"/>
               <a:ext cx="68579" cy="68579"/>
             </a:xfrm>
             <a:prstGeom prst="ellipse">
@@ -4169,7 +4169,7 @@
           </p:nvSpPr>
           <p:spPr>
             <a:xfrm>
-              <a:off x="2618288" y="3024652"/>
+              <a:off x="3350929" y="3307285"/>
               <a:ext cx="68579" cy="68579"/>
             </a:xfrm>
             <a:prstGeom prst="ellipse">
@@ -4195,7 +4195,7 @@
           </p:nvSpPr>
           <p:spPr>
             <a:xfrm>
-              <a:off x="3192431" y="2758002"/>
+              <a:off x="4075784" y="3493519"/>
               <a:ext cx="68579" cy="68579"/>
             </a:xfrm>
             <a:prstGeom prst="ellipse">
@@ -4221,7 +4221,7 @@
           </p:nvSpPr>
           <p:spPr>
             <a:xfrm>
-              <a:off x="1333923" y="3079155"/>
+              <a:off x="3993393" y="3768842"/>
               <a:ext cx="68579" cy="68579"/>
             </a:xfrm>
             <a:prstGeom prst="ellipse">
@@ -4247,7 +4247,7 @@
           </p:nvSpPr>
           <p:spPr>
             <a:xfrm>
-              <a:off x="3965125" y="3824979"/>
+              <a:off x="3377273" y="3080738"/>
               <a:ext cx="68579" cy="68579"/>
             </a:xfrm>
             <a:prstGeom prst="ellipse">
@@ -4273,7 +4273,7 @@
           </p:nvSpPr>
           <p:spPr>
             <a:xfrm>
-              <a:off x="2594684" y="3378461"/>
+              <a:off x="3430439" y="3671685"/>
               <a:ext cx="68579" cy="68579"/>
             </a:xfrm>
             <a:prstGeom prst="ellipse">
@@ -4299,7 +4299,7 @@
           </p:nvSpPr>
           <p:spPr>
             <a:xfrm>
-              <a:off x="3223063" y="2860281"/>
+              <a:off x="1333923" y="3358372"/>
               <a:ext cx="68579" cy="68579"/>
             </a:xfrm>
             <a:prstGeom prst="ellipse">
@@ -4325,7 +4325,7 @@
           </p:nvSpPr>
           <p:spPr>
             <a:xfrm>
-              <a:off x="4587709" y="3427165"/>
+              <a:off x="3619235" y="3199548"/>
               <a:ext cx="68579" cy="68579"/>
             </a:xfrm>
             <a:prstGeom prst="ellipse">
@@ -4351,7 +4351,7 @@
           </p:nvSpPr>
           <p:spPr>
             <a:xfrm>
-              <a:off x="2090411" y="2944099"/>
+              <a:off x="4166237" y="2794141"/>
               <a:ext cx="68579" cy="68579"/>
             </a:xfrm>
             <a:prstGeom prst="ellipse">
@@ -4377,7 +4377,7 @@
           </p:nvSpPr>
           <p:spPr>
             <a:xfrm>
-              <a:off x="2876104" y="3252835"/>
+              <a:off x="4425526" y="4167775"/>
               <a:ext cx="68579" cy="68579"/>
             </a:xfrm>
             <a:prstGeom prst="ellipse">
@@ -4403,7 +4403,7 @@
           </p:nvSpPr>
           <p:spPr>
             <a:xfrm>
-              <a:off x="3317335" y="3012888"/>
+              <a:off x="2721087" y="3339210"/>
               <a:ext cx="68579" cy="68579"/>
             </a:xfrm>
             <a:prstGeom prst="ellipse">
@@ -4429,7 +4429,7 @@
           </p:nvSpPr>
           <p:spPr>
             <a:xfrm>
-              <a:off x="4031130" y="3119813"/>
+              <a:off x="4467307" y="3359620"/>
               <a:ext cx="68579" cy="68579"/>
             </a:xfrm>
             <a:prstGeom prst="ellipse">
@@ -4455,7 +4455,7 @@
           </p:nvSpPr>
           <p:spPr>
             <a:xfrm>
-              <a:off x="4460560" y="2698007"/>
+              <a:off x="1814567" y="3167308"/>
               <a:ext cx="68579" cy="68579"/>
             </a:xfrm>
             <a:prstGeom prst="ellipse">
@@ -4481,7 +4481,7 @@
           </p:nvSpPr>
           <p:spPr>
             <a:xfrm>
-              <a:off x="3079344" y="3280182"/>
+              <a:off x="3538194" y="3230158"/>
               <a:ext cx="68579" cy="68579"/>
             </a:xfrm>
             <a:prstGeom prst="ellipse">
@@ -4507,7 +4507,7 @@
           </p:nvSpPr>
           <p:spPr>
             <a:xfrm>
-              <a:off x="1898071" y="3073107"/>
+              <a:off x="4173661" y="3567584"/>
               <a:ext cx="68579" cy="68579"/>
             </a:xfrm>
             <a:prstGeom prst="ellipse">
@@ -4533,7 +4533,7 @@
           </p:nvSpPr>
           <p:spPr>
             <a:xfrm>
-              <a:off x="2682073" y="2815563"/>
+              <a:off x="2585394" y="3702088"/>
               <a:ext cx="68579" cy="68579"/>
             </a:xfrm>
             <a:prstGeom prst="ellipse">
@@ -4559,7 +4559,7 @@
           </p:nvSpPr>
           <p:spPr>
             <a:xfrm>
-              <a:off x="1417187" y="2863637"/>
+              <a:off x="1824428" y="3344901"/>
               <a:ext cx="68579" cy="68579"/>
             </a:xfrm>
             <a:prstGeom prst="ellipse">
@@ -4585,7 +4585,7 @@
           </p:nvSpPr>
           <p:spPr>
             <a:xfrm>
-              <a:off x="4304463" y="2907966"/>
+              <a:off x="3197425" y="2760103"/>
               <a:ext cx="68579" cy="68579"/>
             </a:xfrm>
             <a:prstGeom prst="ellipse">
@@ -4611,7 +4611,7 @@
           </p:nvSpPr>
           <p:spPr>
             <a:xfrm>
-              <a:off x="3438221" y="3156801"/>
+              <a:off x="2180388" y="3230631"/>
               <a:ext cx="68579" cy="68579"/>
             </a:xfrm>
             <a:prstGeom prst="ellipse">
@@ -4637,7 +4637,7 @@
           </p:nvSpPr>
           <p:spPr>
             <a:xfrm>
-              <a:off x="4597818" y="4044469"/>
+              <a:off x="4579507" y="3662764"/>
               <a:ext cx="68579" cy="68579"/>
             </a:xfrm>
             <a:prstGeom prst="ellipse">
@@ -4663,7 +4663,7 @@
           </p:nvSpPr>
           <p:spPr>
             <a:xfrm>
-              <a:off x="3116211" y="3356687"/>
+              <a:off x="2692847" y="3740350"/>
               <a:ext cx="68579" cy="68579"/>
             </a:xfrm>
             <a:prstGeom prst="ellipse">
@@ -4689,7 +4689,7 @@
           </p:nvSpPr>
           <p:spPr>
             <a:xfrm>
-              <a:off x="5122082" y="3850727"/>
+              <a:off x="3486068" y="2942070"/>
               <a:ext cx="68579" cy="68579"/>
             </a:xfrm>
             <a:prstGeom prst="ellipse">
@@ -4715,7 +4715,7 @@
           </p:nvSpPr>
           <p:spPr>
             <a:xfrm>
-              <a:off x="3736505" y="3536123"/>
+              <a:off x="3445269" y="2772318"/>
               <a:ext cx="68579" cy="68579"/>
             </a:xfrm>
             <a:prstGeom prst="ellipse">
@@ -4741,7 +4741,7 @@
           </p:nvSpPr>
           <p:spPr>
             <a:xfrm>
-              <a:off x="3973551" y="3896126"/>
+              <a:off x="3610797" y="3482765"/>
               <a:ext cx="68579" cy="68579"/>
             </a:xfrm>
             <a:prstGeom prst="ellipse">
@@ -4767,7 +4767,7 @@
           </p:nvSpPr>
           <p:spPr>
             <a:xfrm>
-              <a:off x="5083851" y="3641781"/>
+              <a:off x="2371203" y="2388869"/>
               <a:ext cx="68579" cy="68579"/>
             </a:xfrm>
             <a:prstGeom prst="ellipse">
@@ -4793,7 +4793,7 @@
           </p:nvSpPr>
           <p:spPr>
             <a:xfrm>
-              <a:off x="2834064" y="3712120"/>
+              <a:off x="4079923" y="3563241"/>
               <a:ext cx="68579" cy="68579"/>
             </a:xfrm>
             <a:prstGeom prst="ellipse">
@@ -4819,7 +4819,7 @@
           </p:nvSpPr>
           <p:spPr>
             <a:xfrm>
-              <a:off x="4229766" y="3144546"/>
+              <a:off x="3930401" y="3194558"/>
               <a:ext cx="68579" cy="68579"/>
             </a:xfrm>
             <a:prstGeom prst="ellipse">
@@ -4845,7 +4845,7 @@
           </p:nvSpPr>
           <p:spPr>
             <a:xfrm>
-              <a:off x="4189851" y="2963433"/>
+              <a:off x="2368468" y="2818024"/>
               <a:ext cx="68579" cy="68579"/>
             </a:xfrm>
             <a:prstGeom prst="ellipse">
@@ -4871,18 +4871,18 @@
           </p:nvSpPr>
           <p:spPr>
             <a:xfrm>
-              <a:off x="2013904" y="4325112"/>
-              <a:ext cx="2699190" cy="0"/>
+              <a:off x="1800389" y="4325112"/>
+              <a:ext cx="3479744" cy="0"/>
             </a:xfrm>
             <a:custGeom>
               <a:avLst/>
               <a:pathLst>
-                <a:path w="2699190" h="0">
+                <a:path w="3479744" h="0">
                   <a:moveTo>
                     <a:pt x="0" y="0"/>
                   </a:moveTo>
                   <a:lnTo>
-                    <a:pt x="2699190" y="0"/>
+                    <a:pt x="3479744" y="0"/>
                   </a:lnTo>
                 </a:path>
               </a:pathLst>
@@ -4911,7 +4911,7 @@
           </p:nvSpPr>
           <p:spPr>
             <a:xfrm>
-              <a:off x="2013904" y="4325112"/>
+              <a:off x="1800389" y="4325112"/>
               <a:ext cx="0" cy="91439"/>
             </a:xfrm>
             <a:custGeom>
@@ -4951,7 +4951,7 @@
           </p:nvSpPr>
           <p:spPr>
             <a:xfrm>
-              <a:off x="2913634" y="4325112"/>
+              <a:off x="2496338" y="4325112"/>
               <a:ext cx="0" cy="91439"/>
             </a:xfrm>
             <a:custGeom>
@@ -4991,7 +4991,7 @@
           </p:nvSpPr>
           <p:spPr>
             <a:xfrm>
-              <a:off x="3813364" y="4325112"/>
+              <a:off x="3192286" y="4325112"/>
               <a:ext cx="0" cy="91439"/>
             </a:xfrm>
             <a:custGeom>
@@ -5031,7 +5031,7 @@
           </p:nvSpPr>
           <p:spPr>
             <a:xfrm>
-              <a:off x="4713094" y="4325112"/>
+              <a:off x="3888235" y="4325112"/>
               <a:ext cx="0" cy="91439"/>
             </a:xfrm>
             <a:custGeom>
@@ -5065,13 +5065,93 @@
         </p:sp>
         <p:sp>
           <p:nvSpPr>
-            <p:cNvPr id="109" name="tx109"/>
-            <p:cNvSpPr/>
-            <p:nvPr/>
-          </p:nvSpPr>
-          <p:spPr>
-            <a:xfrm>
-              <a:off x="1971525" y="4542972"/>
+            <p:cNvPr id="109" name="pl109"/>
+            <p:cNvSpPr/>
+            <p:nvPr/>
+          </p:nvSpPr>
+          <p:spPr>
+            <a:xfrm>
+              <a:off x="4584184" y="4325112"/>
+              <a:ext cx="0" cy="91439"/>
+            </a:xfrm>
+            <a:custGeom>
+              <a:avLst/>
+              <a:pathLst>
+                <a:path w="0" h="91439">
+                  <a:moveTo>
+                    <a:pt x="0" y="0"/>
+                  </a:moveTo>
+                  <a:lnTo>
+                    <a:pt x="0" y="91439"/>
+                  </a:lnTo>
+                </a:path>
+              </a:pathLst>
+            </a:custGeom>
+            <a:ln w="9525" cap="rnd">
+              <a:solidFill>
+                <a:srgbClr val="000000">
+                  <a:alpha val="100000"/>
+                </a:srgbClr>
+              </a:solidFill>
+              <a:prstDash val="solid"/>
+              <a:round/>
+            </a:ln>
+          </p:spPr>
+          <p:txBody>
+            <a:bodyPr/>
+            <a:lstStyle/>
+            <a:p/>
+          </p:txBody>
+        </p:sp>
+        <p:sp>
+          <p:nvSpPr>
+            <p:cNvPr id="110" name="pl110"/>
+            <p:cNvSpPr/>
+            <p:nvPr/>
+          </p:nvSpPr>
+          <p:spPr>
+            <a:xfrm>
+              <a:off x="5280133" y="4325112"/>
+              <a:ext cx="0" cy="91439"/>
+            </a:xfrm>
+            <a:custGeom>
+              <a:avLst/>
+              <a:pathLst>
+                <a:path w="0" h="91439">
+                  <a:moveTo>
+                    <a:pt x="0" y="0"/>
+                  </a:moveTo>
+                  <a:lnTo>
+                    <a:pt x="0" y="91439"/>
+                  </a:lnTo>
+                </a:path>
+              </a:pathLst>
+            </a:custGeom>
+            <a:ln w="9525" cap="rnd">
+              <a:solidFill>
+                <a:srgbClr val="000000">
+                  <a:alpha val="100000"/>
+                </a:srgbClr>
+              </a:solidFill>
+              <a:prstDash val="solid"/>
+              <a:round/>
+            </a:ln>
+          </p:spPr>
+          <p:txBody>
+            <a:bodyPr/>
+            <a:lstStyle/>
+            <a:p/>
+          </p:txBody>
+        </p:sp>
+        <p:sp>
+          <p:nvSpPr>
+            <p:cNvPr id="111" name="tx111"/>
+            <p:cNvSpPr/>
+            <p:nvPr/>
+          </p:nvSpPr>
+          <p:spPr>
+            <a:xfrm>
+              <a:off x="1758010" y="4542972"/>
               <a:ext cx="84757" cy="111323"/>
             </a:xfrm>
             <a:prstGeom prst="rect">
@@ -5111,13 +5191,13 @@
         </p:sp>
         <p:sp>
           <p:nvSpPr>
-            <p:cNvPr id="110" name="tx110"/>
-            <p:cNvSpPr/>
-            <p:nvPr/>
-          </p:nvSpPr>
-          <p:spPr>
-            <a:xfrm>
-              <a:off x="2871255" y="4542972"/>
+            <p:cNvPr id="112" name="tx112"/>
+            <p:cNvSpPr/>
+            <p:nvPr/>
+          </p:nvSpPr>
+          <p:spPr>
+            <a:xfrm>
+              <a:off x="2453959" y="4542972"/>
               <a:ext cx="84757" cy="111323"/>
             </a:xfrm>
             <a:prstGeom prst="rect">
@@ -5157,13 +5237,13 @@
         </p:sp>
         <p:sp>
           <p:nvSpPr>
-            <p:cNvPr id="111" name="tx111"/>
-            <p:cNvSpPr/>
-            <p:nvPr/>
-          </p:nvSpPr>
-          <p:spPr>
-            <a:xfrm>
-              <a:off x="3728606" y="4542972"/>
+            <p:cNvPr id="113" name="tx113"/>
+            <p:cNvSpPr/>
+            <p:nvPr/>
+          </p:nvSpPr>
+          <p:spPr>
+            <a:xfrm>
+              <a:off x="3107529" y="4542972"/>
               <a:ext cx="169515" cy="111323"/>
             </a:xfrm>
             <a:prstGeom prst="rect">
@@ -5203,13 +5283,13 @@
         </p:sp>
         <p:sp>
           <p:nvSpPr>
-            <p:cNvPr id="112" name="tx112"/>
-            <p:cNvSpPr/>
-            <p:nvPr/>
-          </p:nvSpPr>
-          <p:spPr>
-            <a:xfrm>
-              <a:off x="4628336" y="4544758"/>
+            <p:cNvPr id="114" name="tx114"/>
+            <p:cNvSpPr/>
+            <p:nvPr/>
+          </p:nvSpPr>
+          <p:spPr>
+            <a:xfrm>
+              <a:off x="3803478" y="4544758"/>
               <a:ext cx="169515" cy="109537"/>
             </a:xfrm>
             <a:prstGeom prst="rect">
@@ -5249,21 +5329,113 @@
         </p:sp>
         <p:sp>
           <p:nvSpPr>
-            <p:cNvPr id="113" name="pl113"/>
-            <p:cNvSpPr/>
-            <p:nvPr/>
-          </p:nvSpPr>
-          <p:spPr>
-            <a:xfrm>
-              <a:off x="1207008" y="2392231"/>
-              <a:ext cx="0" cy="1807174"/>
+            <p:cNvPr id="115" name="tx115"/>
+            <p:cNvSpPr/>
+            <p:nvPr/>
+          </p:nvSpPr>
+          <p:spPr>
+            <a:xfrm>
+              <a:off x="4499426" y="4544758"/>
+              <a:ext cx="169515" cy="109537"/>
+            </a:xfrm>
+            <a:prstGeom prst="rect">
+              <a:avLst/>
+            </a:prstGeom>
+            <a:noFill/>
+          </p:spPr>
+          <p:txBody>
+            <a:bodyPr lIns="0" rIns="0" tIns="0" bIns="0" anchorCtr="1" anchor="ctr" wrap="none"/>
+            <a:lstStyle/>
+            <a:p>
+              <a:pPr algn="l" marL="0" marR="0" indent="0">
+                <a:lnSpc>
+                  <a:spcPts val="1200"/>
+                </a:lnSpc>
+                <a:spcBef>
+                  <a:spcPts val="0"/>
+                </a:spcBef>
+                <a:spcAft>
+                  <a:spcPts val="0"/>
+                </a:spcAft>
+              </a:pPr>
+              <a:r>
+                <a:rPr sz="1200">
+                  <a:solidFill>
+                    <a:srgbClr val="000000">
+                      <a:alpha val="100000"/>
+                    </a:srgbClr>
+                  </a:solidFill>
+                  <a:latin typeface="Arial"/>
+                  <a:cs typeface="Arial"/>
+                </a:rPr>
+                <a:t>12</a:t>
+              </a:r>
+            </a:p>
+          </p:txBody>
+        </p:sp>
+        <p:sp>
+          <p:nvSpPr>
+            <p:cNvPr id="116" name="tx116"/>
+            <p:cNvSpPr/>
+            <p:nvPr/>
+          </p:nvSpPr>
+          <p:spPr>
+            <a:xfrm>
+              <a:off x="5195375" y="4542774"/>
+              <a:ext cx="169515" cy="111521"/>
+            </a:xfrm>
+            <a:prstGeom prst="rect">
+              <a:avLst/>
+            </a:prstGeom>
+            <a:noFill/>
+          </p:spPr>
+          <p:txBody>
+            <a:bodyPr lIns="0" rIns="0" tIns="0" bIns="0" anchorCtr="1" anchor="ctr" wrap="none"/>
+            <a:lstStyle/>
+            <a:p>
+              <a:pPr algn="l" marL="0" marR="0" indent="0">
+                <a:lnSpc>
+                  <a:spcPts val="1200"/>
+                </a:lnSpc>
+                <a:spcBef>
+                  <a:spcPts val="0"/>
+                </a:spcBef>
+                <a:spcAft>
+                  <a:spcPts val="0"/>
+                </a:spcAft>
+              </a:pPr>
+              <a:r>
+                <a:rPr sz="1200">
+                  <a:solidFill>
+                    <a:srgbClr val="000000">
+                      <a:alpha val="100000"/>
+                    </a:srgbClr>
+                  </a:solidFill>
+                  <a:latin typeface="Arial"/>
+                  <a:cs typeface="Arial"/>
+                </a:rPr>
+                <a:t>13</a:t>
+              </a:r>
+            </a:p>
+          </p:txBody>
+        </p:sp>
+        <p:sp>
+          <p:nvSpPr>
+            <p:cNvPr id="117" name="pl117"/>
+            <p:cNvSpPr/>
+            <p:nvPr/>
+          </p:nvSpPr>
+          <p:spPr>
+            <a:xfrm>
+              <a:off x="1207008" y="2643316"/>
+              <a:ext cx="0" cy="1416758"/>
             </a:xfrm>
             <a:custGeom>
               <a:avLst/>
               <a:pathLst>
-                <a:path w="0" h="1807174">
+                <a:path w="0" h="1416758">
                   <a:moveTo>
-                    <a:pt x="0" y="1807174"/>
+                    <a:pt x="0" y="1416758"/>
                   </a:moveTo>
                   <a:lnTo>
                     <a:pt x="0" y="0"/>
@@ -5289,13 +5461,13 @@
         </p:sp>
         <p:sp>
           <p:nvSpPr>
-            <p:cNvPr id="114" name="pl114"/>
-            <p:cNvSpPr/>
-            <p:nvPr/>
-          </p:nvSpPr>
-          <p:spPr>
-            <a:xfrm>
-              <a:off x="1115568" y="4199405"/>
+            <p:cNvPr id="118" name="pl118"/>
+            <p:cNvSpPr/>
+            <p:nvPr/>
+          </p:nvSpPr>
+          <p:spPr>
+            <a:xfrm>
+              <a:off x="1115568" y="4060074"/>
               <a:ext cx="91439" cy="0"/>
             </a:xfrm>
             <a:custGeom>
@@ -5329,13 +5501,13 @@
         </p:sp>
         <p:sp>
           <p:nvSpPr>
-            <p:cNvPr id="115" name="pl115"/>
-            <p:cNvSpPr/>
-            <p:nvPr/>
-          </p:nvSpPr>
-          <p:spPr>
-            <a:xfrm>
-              <a:off x="1115568" y="3747611"/>
+            <p:cNvPr id="119" name="pl119"/>
+            <p:cNvSpPr/>
+            <p:nvPr/>
+          </p:nvSpPr>
+          <p:spPr>
+            <a:xfrm>
+              <a:off x="1115568" y="3705885"/>
               <a:ext cx="91439" cy="0"/>
             </a:xfrm>
             <a:custGeom>
@@ -5369,13 +5541,13 @@
         </p:sp>
         <p:sp>
           <p:nvSpPr>
-            <p:cNvPr id="116" name="pl116"/>
-            <p:cNvSpPr/>
-            <p:nvPr/>
-          </p:nvSpPr>
-          <p:spPr>
-            <a:xfrm>
-              <a:off x="1115568" y="3295818"/>
+            <p:cNvPr id="120" name="pl120"/>
+            <p:cNvSpPr/>
+            <p:nvPr/>
+          </p:nvSpPr>
+          <p:spPr>
+            <a:xfrm>
+              <a:off x="1115568" y="3351695"/>
               <a:ext cx="91439" cy="0"/>
             </a:xfrm>
             <a:custGeom>
@@ -5409,13 +5581,13 @@
         </p:sp>
         <p:sp>
           <p:nvSpPr>
-            <p:cNvPr id="117" name="pl117"/>
-            <p:cNvSpPr/>
-            <p:nvPr/>
-          </p:nvSpPr>
-          <p:spPr>
-            <a:xfrm>
-              <a:off x="1115568" y="2844024"/>
+            <p:cNvPr id="121" name="pl121"/>
+            <p:cNvSpPr/>
+            <p:nvPr/>
+          </p:nvSpPr>
+          <p:spPr>
+            <a:xfrm>
+              <a:off x="1115568" y="2997506"/>
               <a:ext cx="91439" cy="0"/>
             </a:xfrm>
             <a:custGeom>
@@ -5449,13 +5621,13 @@
         </p:sp>
         <p:sp>
           <p:nvSpPr>
-            <p:cNvPr id="118" name="pl118"/>
-            <p:cNvSpPr/>
-            <p:nvPr/>
-          </p:nvSpPr>
-          <p:spPr>
-            <a:xfrm>
-              <a:off x="1115568" y="2392231"/>
+            <p:cNvPr id="122" name="pl122"/>
+            <p:cNvSpPr/>
+            <p:nvPr/>
+          </p:nvSpPr>
+          <p:spPr>
+            <a:xfrm>
+              <a:off x="1115568" y="2643316"/>
               <a:ext cx="91439" cy="0"/>
             </a:xfrm>
             <a:custGeom>
@@ -5489,13 +5661,13 @@
         </p:sp>
         <p:sp>
           <p:nvSpPr>
-            <p:cNvPr id="119" name="tx119"/>
+            <p:cNvPr id="123" name="tx123"/>
             <p:cNvSpPr/>
             <p:nvPr/>
           </p:nvSpPr>
           <p:spPr>
             <a:xfrm rot="-5400000">
-              <a:off x="847132" y="4143743"/>
+              <a:off x="847132" y="4004413"/>
               <a:ext cx="169515" cy="111323"/>
             </a:xfrm>
             <a:prstGeom prst="rect">
@@ -5535,13 +5707,13 @@
         </p:sp>
         <p:sp>
           <p:nvSpPr>
-            <p:cNvPr id="120" name="tx120"/>
+            <p:cNvPr id="124" name="tx124"/>
             <p:cNvSpPr/>
             <p:nvPr/>
           </p:nvSpPr>
           <p:spPr>
             <a:xfrm rot="-5400000">
-              <a:off x="847132" y="3691950"/>
+              <a:off x="847132" y="3650223"/>
               <a:ext cx="169515" cy="111323"/>
             </a:xfrm>
             <a:prstGeom prst="rect">
@@ -5581,13 +5753,13 @@
         </p:sp>
         <p:sp>
           <p:nvSpPr>
-            <p:cNvPr id="121" name="tx121"/>
+            <p:cNvPr id="125" name="tx125"/>
             <p:cNvSpPr/>
             <p:nvPr/>
           </p:nvSpPr>
           <p:spPr>
             <a:xfrm rot="-5400000">
-              <a:off x="804753" y="3240156"/>
+              <a:off x="804753" y="3296034"/>
               <a:ext cx="254272" cy="111323"/>
             </a:xfrm>
             <a:prstGeom prst="rect">
@@ -5627,59 +5799,13 @@
         </p:sp>
         <p:sp>
           <p:nvSpPr>
-            <p:cNvPr id="122" name="tx122"/>
+            <p:cNvPr id="126" name="tx126"/>
             <p:cNvSpPr/>
             <p:nvPr/>
           </p:nvSpPr>
           <p:spPr>
             <a:xfrm rot="-5400000">
-              <a:off x="804753" y="2788363"/>
-              <a:ext cx="254272" cy="111323"/>
-            </a:xfrm>
-            <a:prstGeom prst="rect">
-              <a:avLst/>
-            </a:prstGeom>
-            <a:noFill/>
-          </p:spPr>
-          <p:txBody>
-            <a:bodyPr lIns="0" rIns="0" tIns="0" bIns="0" anchorCtr="1" anchor="ctr" wrap="none"/>
-            <a:lstStyle/>
-            <a:p>
-              <a:pPr algn="l" marL="0" marR="0" indent="0">
-                <a:lnSpc>
-                  <a:spcPts val="1200"/>
-                </a:lnSpc>
-                <a:spcBef>
-                  <a:spcPts val="0"/>
-                </a:spcBef>
-                <a:spcAft>
-                  <a:spcPts val="0"/>
-                </a:spcAft>
-              </a:pPr>
-              <a:r>
-                <a:rPr sz="1200">
-                  <a:solidFill>
-                    <a:srgbClr val="000000">
-                      <a:alpha val="100000"/>
-                    </a:srgbClr>
-                  </a:solidFill>
-                  <a:latin typeface="Arial"/>
-                  <a:cs typeface="Arial"/>
-                </a:rPr>
-                <a:t>101</a:t>
-              </a:r>
-            </a:p>
-          </p:txBody>
-        </p:sp>
-        <p:sp>
-          <p:nvSpPr>
-            <p:cNvPr id="123" name="tx123"/>
-            <p:cNvSpPr/>
-            <p:nvPr/>
-          </p:nvSpPr>
-          <p:spPr>
-            <a:xfrm rot="-5400000">
-              <a:off x="804753" y="2336569"/>
+              <a:off x="804753" y="2587654"/>
               <a:ext cx="254272" cy="111323"/>
             </a:xfrm>
             <a:prstGeom prst="rect">
@@ -5719,7 +5845,7 @@
         </p:sp>
         <p:sp>
           <p:nvSpPr>
-            <p:cNvPr id="124" name="pl124"/>
+            <p:cNvPr id="127" name="pl127"/>
             <p:cNvSpPr/>
             <p:nvPr/>
           </p:nvSpPr>
@@ -5768,7 +5894,7 @@
         </p:sp>
         <p:sp>
           <p:nvSpPr>
-            <p:cNvPr id="125" name="tx125"/>
+            <p:cNvPr id="128" name="tx128"/>
             <p:cNvSpPr/>
             <p:nvPr/>
           </p:nvSpPr>
@@ -5814,7 +5940,7 @@
         </p:sp>
         <p:sp>
           <p:nvSpPr>
-            <p:cNvPr id="126" name="tx126"/>
+            <p:cNvPr id="129" name="tx129"/>
             <p:cNvSpPr/>
             <p:nvPr/>
           </p:nvSpPr>
@@ -5860,7 +5986,7 @@
         </p:sp>
         <p:sp>
           <p:nvSpPr>
-            <p:cNvPr id="127" name="tx127"/>
+            <p:cNvPr id="130" name="tx130"/>
             <p:cNvSpPr/>
             <p:nvPr/>
           </p:nvSpPr>

</xml_diff>